<commit_message>
Ejercicio Base y Account
</commit_message>
<xml_diff>
--- a/Diapositivas/Test Driven Development.pptx
+++ b/Diapositivas/Test Driven Development.pptx
@@ -5,7 +5,7 @@
     <p:sldMasterId id="2147483684" r:id="rId1"/>
   </p:sldMasterIdLst>
   <p:notesMasterIdLst>
-    <p:notesMasterId r:id="rId60"/>
+    <p:notesMasterId r:id="rId59"/>
   </p:notesMasterIdLst>
   <p:sldIdLst>
     <p:sldId id="367" r:id="rId2"/>
@@ -50,22 +50,21 @@
     <p:sldId id="688" r:id="rId41"/>
     <p:sldId id="689" r:id="rId42"/>
     <p:sldId id="690" r:id="rId43"/>
-    <p:sldId id="691" r:id="rId44"/>
-    <p:sldId id="692" r:id="rId45"/>
-    <p:sldId id="687" r:id="rId46"/>
-    <p:sldId id="662" r:id="rId47"/>
-    <p:sldId id="664" r:id="rId48"/>
-    <p:sldId id="665" r:id="rId49"/>
-    <p:sldId id="666" r:id="rId50"/>
-    <p:sldId id="667" r:id="rId51"/>
-    <p:sldId id="668" r:id="rId52"/>
-    <p:sldId id="653" r:id="rId53"/>
-    <p:sldId id="645" r:id="rId54"/>
-    <p:sldId id="649" r:id="rId55"/>
-    <p:sldId id="669" r:id="rId56"/>
-    <p:sldId id="648" r:id="rId57"/>
-    <p:sldId id="647" r:id="rId58"/>
-    <p:sldId id="654" r:id="rId59"/>
+    <p:sldId id="692" r:id="rId44"/>
+    <p:sldId id="687" r:id="rId45"/>
+    <p:sldId id="662" r:id="rId46"/>
+    <p:sldId id="664" r:id="rId47"/>
+    <p:sldId id="665" r:id="rId48"/>
+    <p:sldId id="666" r:id="rId49"/>
+    <p:sldId id="667" r:id="rId50"/>
+    <p:sldId id="668" r:id="rId51"/>
+    <p:sldId id="653" r:id="rId52"/>
+    <p:sldId id="645" r:id="rId53"/>
+    <p:sldId id="649" r:id="rId54"/>
+    <p:sldId id="669" r:id="rId55"/>
+    <p:sldId id="648" r:id="rId56"/>
+    <p:sldId id="647" r:id="rId57"/>
+    <p:sldId id="654" r:id="rId58"/>
   </p:sldIdLst>
   <p:sldSz cx="9144000" cy="6858000" type="screen4x3"/>
   <p:notesSz cx="6858000" cy="9144000"/>
@@ -166,7 +165,7 @@
   </p:defaultTextStyle>
   <p:extLst>
     <p:ext uri="{EFAFB233-063F-42B5-8137-9DF3F51BA10A}">
-      <p15:sldGuideLst xmlns="" xmlns:p15="http://schemas.microsoft.com/office/powerpoint/2012/main">
+      <p15:sldGuideLst xmlns:p15="http://schemas.microsoft.com/office/powerpoint/2012/main">
         <p15:guide id="1" orient="horz" pos="2160">
           <p15:clr>
             <a:srgbClr val="A4A3A4"/>
@@ -186,7 +185,7 @@
 <file path=ppt/charts/chart1.xml><?xml version="1.0" encoding="utf-8"?>
 <c:chartSpace xmlns:c="http://schemas.openxmlformats.org/drawingml/2006/chart" xmlns:a="http://schemas.openxmlformats.org/drawingml/2006/main" xmlns:r="http://schemas.openxmlformats.org/officeDocument/2006/relationships">
   <c:date1904 val="0"/>
-  <c:lang val="es-PE"/>
+  <c:lang val="es-ES"/>
   <c:roundedCorners val="0"/>
   <mc:AlternateContent xmlns:mc="http://schemas.openxmlformats.org/markup-compatibility/2006">
     <mc:Choice xmlns:c14="http://schemas.microsoft.com/office/drawing/2007/8/2/chart" Requires="c14">
@@ -287,11 +286,11 @@
           <c:showBubbleSize val="0"/>
         </c:dLbls>
         <c:gapWidth val="150"/>
-        <c:axId val="76526336"/>
-        <c:axId val="76528256"/>
+        <c:axId val="134473192"/>
+        <c:axId val="133860128"/>
       </c:barChart>
       <c:catAx>
-        <c:axId val="76526336"/>
+        <c:axId val="134473192"/>
         <c:scaling>
           <c:orientation val="minMax"/>
         </c:scaling>
@@ -323,7 +322,7 @@
         <c:majorTickMark val="out"/>
         <c:minorTickMark val="none"/>
         <c:tickLblPos val="nextTo"/>
-        <c:crossAx val="76528256"/>
+        <c:crossAx val="133860128"/>
         <c:crosses val="autoZero"/>
         <c:auto val="1"/>
         <c:lblAlgn val="ctr"/>
@@ -331,7 +330,7 @@
         <c:noMultiLvlLbl val="0"/>
       </c:catAx>
       <c:valAx>
-        <c:axId val="76528256"/>
+        <c:axId val="133860128"/>
         <c:scaling>
           <c:orientation val="minMax"/>
         </c:scaling>
@@ -342,7 +341,7 @@
         <c:majorTickMark val="out"/>
         <c:minorTickMark val="none"/>
         <c:tickLblPos val="nextTo"/>
-        <c:crossAx val="76526336"/>
+        <c:crossAx val="134473192"/>
         <c:crosses val="autoZero"/>
         <c:crossBetween val="between"/>
       </c:valAx>
@@ -366,7 +365,7 @@
       <a:pPr>
         <a:defRPr sz="1800"/>
       </a:pPr>
-      <a:endParaRPr lang="es-PE"/>
+      <a:endParaRPr lang="en-US"/>
     </a:p>
   </c:txPr>
   <c:externalData r:id="rId1">
@@ -457,7 +456,7 @@
           <a:p>
             <a:fld id="{82731913-02B6-467D-B183-D787C0857BBF}" type="datetimeFigureOut">
               <a:rPr lang="es-PE" smtClean="0"/>
-              <a:t>13/12/2013</a:t>
+              <a:t>14/03/2014</a:t>
             </a:fld>
             <a:endParaRPr lang="es-PE"/>
           </a:p>
@@ -5428,13 +5427,6 @@
           <a:bodyPr/>
           <a:lstStyle/>
           <a:p>
-            <a:pPr marL="285750" indent="-285750">
-              <a:buFont typeface="Arial" panose="020B0604020202020204" pitchFamily="34" charset="0"/>
-              <a:buChar char="•"/>
-            </a:pPr>
-            <a:endParaRPr lang="es-PE" sz="1200" dirty="0" smtClean="0"/>
-          </a:p>
-          <a:p>
             <a:r>
               <a:rPr lang="en-US" sz="1200" b="0" i="0" kern="1200" dirty="0" smtClean="0">
                 <a:solidFill>
@@ -5628,6 +5620,18 @@
           <a:lstStyle/>
           <a:p>
             <a:r>
+              <a:rPr lang="en-US" sz="1200" b="0" i="1" kern="1200" dirty="0" smtClean="0">
+                <a:solidFill>
+                  <a:schemeClr val="tx1"/>
+                </a:solidFill>
+                <a:effectLst/>
+                <a:latin typeface="+mn-lt"/>
+                <a:ea typeface="+mn-ea"/>
+                <a:cs typeface="+mn-cs"/>
+              </a:rPr>
+              <a:t>you don't apply TDD to the GUI, you design the GUI in such as way that there's a layer just underneath you can develop with TDD.</a:t>
+            </a:r>
+            <a:r>
               <a:rPr lang="en-US" sz="1200" b="0" i="0" kern="1200" dirty="0" smtClean="0">
                 <a:solidFill>
                   <a:schemeClr val="tx1"/>
@@ -5638,6 +5642,48 @@
                 <a:cs typeface="+mn-cs"/>
               </a:rPr>
               <a:t> </a:t>
+            </a:r>
+          </a:p>
+          <a:p>
+            <a:endParaRPr lang="en-US" sz="1200" b="0" i="0" kern="1200" dirty="0" smtClean="0">
+              <a:solidFill>
+                <a:schemeClr val="tx1"/>
+              </a:solidFill>
+              <a:effectLst/>
+              <a:latin typeface="+mn-lt"/>
+              <a:ea typeface="+mn-ea"/>
+              <a:cs typeface="+mn-cs"/>
+            </a:endParaRPr>
+          </a:p>
+          <a:p>
+            <a:r>
+              <a:rPr lang="en-US" sz="1200" b="0" i="0" kern="1200" dirty="0" smtClean="0">
+                <a:solidFill>
+                  <a:schemeClr val="tx1"/>
+                </a:solidFill>
+                <a:effectLst/>
+                <a:latin typeface="+mn-lt"/>
+                <a:ea typeface="+mn-ea"/>
+                <a:cs typeface="+mn-cs"/>
+              </a:rPr>
+              <a:t>This approach removes the GUI layer from TDD and unit testing. It does not mean the GUI is never tested but just acknowledges that it is not cost effective to pursue automated GUI testing, particularly as part of TDD. Integration and user testing should cover the GUI.</a:t>
+            </a:r>
+          </a:p>
+          <a:p>
+            <a:endParaRPr lang="en-US" sz="1200" b="0" i="0" kern="1200" dirty="0" smtClean="0">
+              <a:solidFill>
+                <a:schemeClr val="tx1"/>
+              </a:solidFill>
+              <a:effectLst/>
+              <a:latin typeface="+mn-lt"/>
+              <a:ea typeface="+mn-ea"/>
+              <a:cs typeface="+mn-cs"/>
+            </a:endParaRPr>
+          </a:p>
+          <a:p>
+            <a:r>
+              <a:rPr lang="es-PE" smtClean="0"/>
+              <a:t>http://emilybache.blogspot.com/2013/04/Outside-In-development-Double-Loop-TDD.html</a:t>
             </a:r>
             <a:endParaRPr lang="es-PE" dirty="0"/>
           </a:p>
@@ -5658,7 +5704,7 @@
           <a:bodyPr/>
           <a:lstStyle/>
           <a:p>
-            <a:fld id="{92D0504E-A398-466F-BEA7-CB196C14635F}" type="slidenum">
+            <a:fld id="{80C14895-23C8-45AE-85D5-3B35E5980A68}" type="slidenum">
               <a:rPr lang="es-PE" smtClean="0"/>
               <a:t>46</a:t>
             </a:fld>
@@ -5669,7 +5715,7 @@
     </p:spTree>
     <p:extLst>
       <p:ext uri="{BB962C8B-B14F-4D97-AF65-F5344CB8AC3E}">
-        <p14:creationId xmlns:p14="http://schemas.microsoft.com/office/powerpoint/2010/main" val="3117317914"/>
+        <p14:creationId xmlns:p14="http://schemas.microsoft.com/office/powerpoint/2010/main" val="3432092158"/>
       </p:ext>
     </p:extLst>
   </p:cSld>
@@ -5724,7 +5770,7 @@
           <a:lstStyle/>
           <a:p>
             <a:r>
-              <a:rPr lang="en-US" sz="1200" b="0" i="1" kern="1200" dirty="0" smtClean="0">
+              <a:rPr lang="en-US" sz="1200" b="1" i="1" kern="1200" dirty="0" smtClean="0">
                 <a:solidFill>
                   <a:schemeClr val="tx1"/>
                 </a:solidFill>
@@ -5733,10 +5779,10 @@
                 <a:ea typeface="+mn-ea"/>
                 <a:cs typeface="+mn-cs"/>
               </a:rPr>
-              <a:t>you don't apply TDD to the GUI, you design the GUI in such as way that there's a layer just underneath you can develop with TDD.</a:t>
-            </a:r>
-            <a:r>
-              <a:rPr lang="en-US" sz="1200" b="0" i="0" kern="1200" dirty="0" smtClean="0">
+              <a:t>When I use a pure bottom-up style, I write more speculative code and go down the wrong path far more often than I’d like</a:t>
+            </a:r>
+            <a:r>
+              <a:rPr lang="en-US" sz="1200" b="0" i="1" kern="1200" dirty="0" smtClean="0">
                 <a:solidFill>
                   <a:schemeClr val="tx1"/>
                 </a:solidFill>
@@ -5745,11 +5791,11 @@
                 <a:ea typeface="+mn-ea"/>
                 <a:cs typeface="+mn-cs"/>
               </a:rPr>
-              <a:t> </a:t>
-            </a:r>
-          </a:p>
-          <a:p>
-            <a:endParaRPr lang="en-US" sz="1200" b="0" i="0" kern="1200" dirty="0" smtClean="0">
+              <a:t>. </a:t>
+            </a:r>
+          </a:p>
+          <a:p>
+            <a:endParaRPr lang="en-US" sz="1200" b="0" i="1" kern="1200" dirty="0" smtClean="0">
               <a:solidFill>
                 <a:schemeClr val="tx1"/>
               </a:solidFill>
@@ -5761,32 +5807,7 @@
           </a:p>
           <a:p>
             <a:r>
-              <a:rPr lang="en-US" sz="1200" b="0" i="0" kern="1200" dirty="0" smtClean="0">
-                <a:solidFill>
-                  <a:schemeClr val="tx1"/>
-                </a:solidFill>
-                <a:effectLst/>
-                <a:latin typeface="+mn-lt"/>
-                <a:ea typeface="+mn-ea"/>
-                <a:cs typeface="+mn-cs"/>
-              </a:rPr>
-              <a:t>This approach removes the GUI layer from TDD and unit testing. It does not mean the GUI is never tested but just acknowledges that it is not cost effective to pursue automated GUI testing, particularly as part of TDD. Integration and user testing should cover the GUI.</a:t>
-            </a:r>
-          </a:p>
-          <a:p>
-            <a:endParaRPr lang="en-US" sz="1200" b="0" i="0" kern="1200" dirty="0" smtClean="0">
-              <a:solidFill>
-                <a:schemeClr val="tx1"/>
-              </a:solidFill>
-              <a:effectLst/>
-              <a:latin typeface="+mn-lt"/>
-              <a:ea typeface="+mn-ea"/>
-              <a:cs typeface="+mn-cs"/>
-            </a:endParaRPr>
-          </a:p>
-          <a:p>
-            <a:r>
-              <a:rPr lang="es-PE" smtClean="0"/>
+              <a:rPr lang="es-PE" dirty="0" smtClean="0"/>
               <a:t>http://emilybache.blogspot.com/2013/04/Outside-In-development-Double-Loop-TDD.html</a:t>
             </a:r>
             <a:endParaRPr lang="es-PE" dirty="0"/>
@@ -5873,33 +5894,7 @@
           <a:bodyPr/>
           <a:lstStyle/>
           <a:p>
-            <a:r>
-              <a:rPr lang="en-US" sz="1200" b="1" i="1" kern="1200" dirty="0" smtClean="0">
-                <a:solidFill>
-                  <a:schemeClr val="tx1"/>
-                </a:solidFill>
-                <a:effectLst/>
-                <a:latin typeface="+mn-lt"/>
-                <a:ea typeface="+mn-ea"/>
-                <a:cs typeface="+mn-cs"/>
-              </a:rPr>
-              <a:t>When I use a pure bottom-up style, I write more speculative code and go down the wrong path far more often than I’d like</a:t>
-            </a:r>
-            <a:r>
-              <a:rPr lang="en-US" sz="1200" b="0" i="1" kern="1200" dirty="0" smtClean="0">
-                <a:solidFill>
-                  <a:schemeClr val="tx1"/>
-                </a:solidFill>
-                <a:effectLst/>
-                <a:latin typeface="+mn-lt"/>
-                <a:ea typeface="+mn-ea"/>
-                <a:cs typeface="+mn-cs"/>
-              </a:rPr>
-              <a:t>. </a:t>
-            </a:r>
-          </a:p>
-          <a:p>
-            <a:endParaRPr lang="en-US" sz="1200" b="0" i="1" kern="1200" dirty="0" smtClean="0">
+            <a:endParaRPr lang="en-US" sz="1200" b="0" i="0" kern="1200" dirty="0" smtClean="0">
               <a:solidFill>
                 <a:schemeClr val="tx1"/>
               </a:solidFill>
@@ -5911,8 +5906,116 @@
           </a:p>
           <a:p>
             <a:r>
-              <a:rPr lang="es-PE" dirty="0" smtClean="0"/>
-              <a:t>http://emilybache.blogspot.com/2013/04/Outside-In-development-Double-Loop-TDD.html</a:t>
+              <a:rPr lang="en-US" sz="1200" b="0" i="0" kern="1200" dirty="0" smtClean="0">
+                <a:solidFill>
+                  <a:schemeClr val="tx1"/>
+                </a:solidFill>
+                <a:effectLst/>
+                <a:latin typeface="+mn-lt"/>
+                <a:ea typeface="+mn-ea"/>
+                <a:cs typeface="+mn-cs"/>
+              </a:rPr>
+              <a:t>Top-down design can also lead to a </a:t>
+            </a:r>
+            <a:r>
+              <a:rPr lang="en-US" sz="1200" b="0" i="0" kern="1200" dirty="0" smtClean="0">
+                <a:solidFill>
+                  <a:schemeClr val="tx1"/>
+                </a:solidFill>
+                <a:effectLst/>
+                <a:latin typeface="+mn-lt"/>
+                <a:ea typeface="+mn-ea"/>
+                <a:cs typeface="+mn-cs"/>
+                <a:hlinkClick r:id="rId3"/>
+              </a:rPr>
+              <a:t>"</a:t>
+            </a:r>
+            <a:r>
+              <a:rPr lang="en-US" sz="1200" b="0" i="0" kern="1200" dirty="0" err="1" smtClean="0">
+                <a:solidFill>
+                  <a:schemeClr val="tx1"/>
+                </a:solidFill>
+                <a:effectLst/>
+                <a:latin typeface="+mn-lt"/>
+                <a:ea typeface="+mn-ea"/>
+                <a:cs typeface="+mn-cs"/>
+                <a:hlinkClick r:id="rId3"/>
+              </a:rPr>
+              <a:t>mockist</a:t>
+            </a:r>
+            <a:r>
+              <a:rPr lang="en-US" sz="1200" b="0" i="0" kern="1200" dirty="0" smtClean="0">
+                <a:solidFill>
+                  <a:schemeClr val="tx1"/>
+                </a:solidFill>
+                <a:effectLst/>
+                <a:latin typeface="+mn-lt"/>
+                <a:ea typeface="+mn-ea"/>
+                <a:cs typeface="+mn-cs"/>
+                <a:hlinkClick r:id="rId3"/>
+              </a:rPr>
+              <a:t>" approach to TDD</a:t>
+            </a:r>
+            <a:r>
+              <a:rPr lang="en-US" sz="1200" b="0" i="0" kern="1200" dirty="0" smtClean="0">
+                <a:solidFill>
+                  <a:schemeClr val="tx1"/>
+                </a:solidFill>
+                <a:effectLst/>
+                <a:latin typeface="+mn-lt"/>
+                <a:ea typeface="+mn-ea"/>
+                <a:cs typeface="+mn-cs"/>
+              </a:rPr>
+              <a:t>, where you need to mock all the required dependencies to implement the high level </a:t>
+            </a:r>
+            <a:r>
+              <a:rPr lang="en-US" sz="1200" b="0" i="0" kern="1200" dirty="0" err="1" smtClean="0">
+                <a:solidFill>
+                  <a:schemeClr val="tx1"/>
+                </a:solidFill>
+                <a:effectLst/>
+                <a:latin typeface="+mn-lt"/>
+                <a:ea typeface="+mn-ea"/>
+                <a:cs typeface="+mn-cs"/>
+              </a:rPr>
+              <a:t>behaviour</a:t>
+            </a:r>
+            <a:r>
+              <a:rPr lang="en-US" sz="1200" b="0" i="0" kern="1200" dirty="0" smtClean="0">
+                <a:solidFill>
+                  <a:schemeClr val="tx1"/>
+                </a:solidFill>
+                <a:effectLst/>
+                <a:latin typeface="+mn-lt"/>
+                <a:ea typeface="+mn-ea"/>
+                <a:cs typeface="+mn-cs"/>
+              </a:rPr>
+              <a:t>. This isn’t necessarily a bad thing, but over-reliance on mocking can </a:t>
+            </a:r>
+            <a:r>
+              <a:rPr lang="en-US" sz="1200" b="0" i="0" kern="1200" dirty="0" smtClean="0">
+                <a:solidFill>
+                  <a:schemeClr val="tx1"/>
+                </a:solidFill>
+                <a:effectLst/>
+                <a:latin typeface="+mn-lt"/>
+                <a:ea typeface="+mn-ea"/>
+                <a:cs typeface="+mn-cs"/>
+                <a:hlinkClick r:id="rId4"/>
+              </a:rPr>
+              <a:t>result in fragile tests</a:t>
+            </a:r>
+            <a:r>
+              <a:rPr lang="en-US" sz="1200" b="0" i="0" kern="1200" dirty="0" smtClean="0">
+                <a:solidFill>
+                  <a:schemeClr val="tx1"/>
+                </a:solidFill>
+                <a:effectLst/>
+                <a:latin typeface="+mn-lt"/>
+                <a:ea typeface="+mn-ea"/>
+                <a:cs typeface="+mn-cs"/>
+              </a:rPr>
+              <a:t>. </a:t>
             </a:r>
             <a:endParaRPr lang="es-PE" dirty="0"/>
           </a:p>
@@ -5998,19 +6101,8 @@
           <a:bodyPr/>
           <a:lstStyle/>
           <a:p>
-            <a:endParaRPr lang="en-US" sz="1200" b="0" i="0" kern="1200" dirty="0" smtClean="0">
-              <a:solidFill>
-                <a:schemeClr val="tx1"/>
-              </a:solidFill>
-              <a:effectLst/>
-              <a:latin typeface="+mn-lt"/>
-              <a:ea typeface="+mn-ea"/>
-              <a:cs typeface="+mn-cs"/>
-            </a:endParaRPr>
-          </a:p>
-          <a:p>
-            <a:r>
-              <a:rPr lang="en-US" sz="1200" b="0" i="0" kern="1200" dirty="0" smtClean="0">
+            <a:r>
+              <a:rPr lang="en-US" sz="1200" b="1" i="1" kern="1200" dirty="0" smtClean="0">
                 <a:solidFill>
                   <a:schemeClr val="tx1"/>
                 </a:solidFill>
@@ -6019,98 +6111,10 @@
                 <a:ea typeface="+mn-ea"/>
                 <a:cs typeface="+mn-cs"/>
               </a:rPr>
-              <a:t>Top-down design can also lead to a </a:t>
-            </a:r>
-            <a:r>
-              <a:rPr lang="en-US" sz="1200" b="0" i="0" kern="1200" dirty="0" smtClean="0">
-                <a:solidFill>
-                  <a:schemeClr val="tx1"/>
-                </a:solidFill>
-                <a:effectLst/>
-                <a:latin typeface="+mn-lt"/>
-                <a:ea typeface="+mn-ea"/>
-                <a:cs typeface="+mn-cs"/>
-                <a:hlinkClick r:id="rId3"/>
-              </a:rPr>
-              <a:t>"</a:t>
-            </a:r>
-            <a:r>
-              <a:rPr lang="en-US" sz="1200" b="0" i="0" kern="1200" dirty="0" err="1" smtClean="0">
-                <a:solidFill>
-                  <a:schemeClr val="tx1"/>
-                </a:solidFill>
-                <a:effectLst/>
-                <a:latin typeface="+mn-lt"/>
-                <a:ea typeface="+mn-ea"/>
-                <a:cs typeface="+mn-cs"/>
-                <a:hlinkClick r:id="rId3"/>
-              </a:rPr>
-              <a:t>mockist</a:t>
-            </a:r>
-            <a:r>
-              <a:rPr lang="en-US" sz="1200" b="0" i="0" kern="1200" dirty="0" smtClean="0">
-                <a:solidFill>
-                  <a:schemeClr val="tx1"/>
-                </a:solidFill>
-                <a:effectLst/>
-                <a:latin typeface="+mn-lt"/>
-                <a:ea typeface="+mn-ea"/>
-                <a:cs typeface="+mn-cs"/>
-                <a:hlinkClick r:id="rId3"/>
-              </a:rPr>
-              <a:t>" approach to TDD</a:t>
-            </a:r>
-            <a:r>
-              <a:rPr lang="en-US" sz="1200" b="0" i="0" kern="1200" dirty="0" smtClean="0">
-                <a:solidFill>
-                  <a:schemeClr val="tx1"/>
-                </a:solidFill>
-                <a:effectLst/>
-                <a:latin typeface="+mn-lt"/>
-                <a:ea typeface="+mn-ea"/>
-                <a:cs typeface="+mn-cs"/>
-              </a:rPr>
-              <a:t>, where you need to mock all the required dependencies to implement the high level </a:t>
-            </a:r>
-            <a:r>
-              <a:rPr lang="en-US" sz="1200" b="0" i="0" kern="1200" dirty="0" err="1" smtClean="0">
-                <a:solidFill>
-                  <a:schemeClr val="tx1"/>
-                </a:solidFill>
-                <a:effectLst/>
-                <a:latin typeface="+mn-lt"/>
-                <a:ea typeface="+mn-ea"/>
-                <a:cs typeface="+mn-cs"/>
-              </a:rPr>
-              <a:t>behaviour</a:t>
-            </a:r>
-            <a:r>
-              <a:rPr lang="en-US" sz="1200" b="0" i="0" kern="1200" dirty="0" smtClean="0">
-                <a:solidFill>
-                  <a:schemeClr val="tx1"/>
-                </a:solidFill>
-                <a:effectLst/>
-                <a:latin typeface="+mn-lt"/>
-                <a:ea typeface="+mn-ea"/>
-                <a:cs typeface="+mn-cs"/>
-              </a:rPr>
-              <a:t>. This isn’t necessarily a bad thing, but over-reliance on mocking can </a:t>
-            </a:r>
-            <a:r>
-              <a:rPr lang="en-US" sz="1200" b="0" i="0" kern="1200" dirty="0" smtClean="0">
-                <a:solidFill>
-                  <a:schemeClr val="tx1"/>
-                </a:solidFill>
-                <a:effectLst/>
-                <a:latin typeface="+mn-lt"/>
-                <a:ea typeface="+mn-ea"/>
-                <a:cs typeface="+mn-cs"/>
-                <a:hlinkClick r:id="rId4"/>
-              </a:rPr>
-              <a:t>result in fragile tests</a:t>
-            </a:r>
-            <a:r>
-              <a:rPr lang="en-US" sz="1200" b="0" i="0" kern="1200" dirty="0" smtClean="0">
+              <a:t>When I use a pure bottom-up style, I write more speculative code and go down the wrong path far more often than I’d like</a:t>
+            </a:r>
+            <a:r>
+              <a:rPr lang="en-US" sz="1200" b="0" i="1" kern="1200" dirty="0" smtClean="0">
                 <a:solidFill>
                   <a:schemeClr val="tx1"/>
                 </a:solidFill>
@@ -6205,6 +6209,96 @@
           <a:bodyPr/>
           <a:lstStyle/>
           <a:p>
+            <a:pPr marL="0" marR="0" indent="0" algn="l" defTabSz="914400" rtl="0" eaLnBrk="1" fontAlgn="auto" latinLnBrk="0" hangingPunct="1">
+              <a:lnSpc>
+                <a:spcPct val="100000"/>
+              </a:lnSpc>
+              <a:spcBef>
+                <a:spcPts val="0"/>
+              </a:spcBef>
+              <a:spcAft>
+                <a:spcPts val="0"/>
+              </a:spcAft>
+              <a:buClrTx/>
+              <a:buSzTx/>
+              <a:buFontTx/>
+              <a:buNone/>
+              <a:tabLst/>
+              <a:defRPr/>
+            </a:pPr>
+            <a:r>
+              <a:rPr lang="en-US" sz="1200" b="0" i="0" kern="1200" dirty="0" smtClean="0">
+                <a:solidFill>
+                  <a:schemeClr val="tx1"/>
+                </a:solidFill>
+                <a:effectLst/>
+                <a:latin typeface="+mn-lt"/>
+                <a:ea typeface="+mn-ea"/>
+                <a:cs typeface="+mn-cs"/>
+              </a:rPr>
+              <a:t>Inside-Out (Classic school, </a:t>
+            </a:r>
+            <a:r>
+              <a:rPr lang="en-US" sz="1200" b="0" i="1" kern="1200" dirty="0" smtClean="0">
+                <a:solidFill>
+                  <a:schemeClr val="tx1"/>
+                </a:solidFill>
+                <a:effectLst/>
+                <a:latin typeface="+mn-lt"/>
+                <a:ea typeface="+mn-ea"/>
+                <a:cs typeface="+mn-cs"/>
+              </a:rPr>
+              <a:t>bottom-up</a:t>
+            </a:r>
+            <a:r>
+              <a:rPr lang="en-US" sz="1200" b="0" i="0" kern="1200" dirty="0" smtClean="0">
+                <a:solidFill>
+                  <a:schemeClr val="tx1"/>
+                </a:solidFill>
+                <a:effectLst/>
+                <a:latin typeface="+mn-lt"/>
+                <a:ea typeface="+mn-ea"/>
+                <a:cs typeface="+mn-cs"/>
+              </a:rPr>
+              <a:t>): you begin at component/class level (inside) and add tests to requirements. As the code evolves (due to </a:t>
+            </a:r>
+            <a:r>
+              <a:rPr lang="en-US" sz="1200" b="0" i="0" kern="1200" dirty="0" err="1" smtClean="0">
+                <a:solidFill>
+                  <a:schemeClr val="tx1"/>
+                </a:solidFill>
+                <a:effectLst/>
+                <a:latin typeface="+mn-lt"/>
+                <a:ea typeface="+mn-ea"/>
+                <a:cs typeface="+mn-cs"/>
+              </a:rPr>
+              <a:t>refactorings</a:t>
+            </a:r>
+            <a:r>
+              <a:rPr lang="en-US" sz="1200" b="0" i="0" kern="1200" dirty="0" smtClean="0">
+                <a:solidFill>
+                  <a:schemeClr val="tx1"/>
+                </a:solidFill>
+                <a:effectLst/>
+                <a:latin typeface="+mn-lt"/>
+                <a:ea typeface="+mn-ea"/>
+                <a:cs typeface="+mn-cs"/>
+              </a:rPr>
+              <a:t>), new collaborators, interactions and other components appear. TDD guides the design completely.</a:t>
+            </a:r>
+          </a:p>
+          <a:p>
+            <a:endParaRPr lang="en-US" sz="1200" b="1" i="1" kern="1200" dirty="0" smtClean="0">
+              <a:solidFill>
+                <a:schemeClr val="tx1"/>
+              </a:solidFill>
+              <a:effectLst/>
+              <a:latin typeface="+mn-lt"/>
+              <a:ea typeface="+mn-ea"/>
+              <a:cs typeface="+mn-cs"/>
+            </a:endParaRPr>
+          </a:p>
+          <a:p>
             <a:r>
               <a:rPr lang="en-US" sz="1200" b="1" i="1" kern="1200" dirty="0" smtClean="0">
                 <a:solidFill>
@@ -6313,23 +6407,6 @@
           <a:bodyPr/>
           <a:lstStyle/>
           <a:p>
-            <a:pPr marL="0" marR="0" indent="0" algn="l" defTabSz="914400" rtl="0" eaLnBrk="1" fontAlgn="auto" latinLnBrk="0" hangingPunct="1">
-              <a:lnSpc>
-                <a:spcPct val="100000"/>
-              </a:lnSpc>
-              <a:spcBef>
-                <a:spcPts val="0"/>
-              </a:spcBef>
-              <a:spcAft>
-                <a:spcPts val="0"/>
-              </a:spcAft>
-              <a:buClrTx/>
-              <a:buSzTx/>
-              <a:buFontTx/>
-              <a:buNone/>
-              <a:tabLst/>
-              <a:defRPr/>
-            </a:pPr>
             <a:r>
               <a:rPr lang="en-US" sz="1200" b="0" i="0" kern="1200" dirty="0" smtClean="0">
                 <a:solidFill>
@@ -6340,92 +6417,7 @@
                 <a:ea typeface="+mn-ea"/>
                 <a:cs typeface="+mn-cs"/>
               </a:rPr>
-              <a:t>Inside-Out (Classic school, </a:t>
-            </a:r>
-            <a:r>
-              <a:rPr lang="en-US" sz="1200" b="0" i="1" kern="1200" dirty="0" smtClean="0">
-                <a:solidFill>
-                  <a:schemeClr val="tx1"/>
-                </a:solidFill>
-                <a:effectLst/>
-                <a:latin typeface="+mn-lt"/>
-                <a:ea typeface="+mn-ea"/>
-                <a:cs typeface="+mn-cs"/>
-              </a:rPr>
-              <a:t>bottom-up</a:t>
-            </a:r>
-            <a:r>
-              <a:rPr lang="en-US" sz="1200" b="0" i="0" kern="1200" dirty="0" smtClean="0">
-                <a:solidFill>
-                  <a:schemeClr val="tx1"/>
-                </a:solidFill>
-                <a:effectLst/>
-                <a:latin typeface="+mn-lt"/>
-                <a:ea typeface="+mn-ea"/>
-                <a:cs typeface="+mn-cs"/>
-              </a:rPr>
-              <a:t>): you begin at component/class level (inside) and add tests to requirements. As the code evolves (due to </a:t>
-            </a:r>
-            <a:r>
-              <a:rPr lang="en-US" sz="1200" b="0" i="0" kern="1200" dirty="0" err="1" smtClean="0">
-                <a:solidFill>
-                  <a:schemeClr val="tx1"/>
-                </a:solidFill>
-                <a:effectLst/>
-                <a:latin typeface="+mn-lt"/>
-                <a:ea typeface="+mn-ea"/>
-                <a:cs typeface="+mn-cs"/>
-              </a:rPr>
-              <a:t>refactorings</a:t>
-            </a:r>
-            <a:r>
-              <a:rPr lang="en-US" sz="1200" b="0" i="0" kern="1200" dirty="0" smtClean="0">
-                <a:solidFill>
-                  <a:schemeClr val="tx1"/>
-                </a:solidFill>
-                <a:effectLst/>
-                <a:latin typeface="+mn-lt"/>
-                <a:ea typeface="+mn-ea"/>
-                <a:cs typeface="+mn-cs"/>
-              </a:rPr>
-              <a:t>), new collaborators, interactions and other components appear. TDD guides the design completely.</a:t>
-            </a:r>
-          </a:p>
-          <a:p>
-            <a:endParaRPr lang="en-US" sz="1200" b="1" i="1" kern="1200" dirty="0" smtClean="0">
-              <a:solidFill>
-                <a:schemeClr val="tx1"/>
-              </a:solidFill>
-              <a:effectLst/>
-              <a:latin typeface="+mn-lt"/>
-              <a:ea typeface="+mn-ea"/>
-              <a:cs typeface="+mn-cs"/>
-            </a:endParaRPr>
-          </a:p>
-          <a:p>
-            <a:r>
-              <a:rPr lang="en-US" sz="1200" b="1" i="1" kern="1200" dirty="0" smtClean="0">
-                <a:solidFill>
-                  <a:schemeClr val="tx1"/>
-                </a:solidFill>
-                <a:effectLst/>
-                <a:latin typeface="+mn-lt"/>
-                <a:ea typeface="+mn-ea"/>
-                <a:cs typeface="+mn-cs"/>
-              </a:rPr>
-              <a:t>When I use a pure bottom-up style, I write more speculative code and go down the wrong path far more often than I’d like</a:t>
-            </a:r>
-            <a:r>
-              <a:rPr lang="en-US" sz="1200" b="0" i="1" kern="1200" dirty="0" smtClean="0">
-                <a:solidFill>
-                  <a:schemeClr val="tx1"/>
-                </a:solidFill>
-                <a:effectLst/>
-                <a:latin typeface="+mn-lt"/>
-                <a:ea typeface="+mn-ea"/>
-                <a:cs typeface="+mn-cs"/>
-              </a:rPr>
-              <a:t>. </a:t>
+              <a:t> </a:t>
             </a:r>
             <a:endParaRPr lang="es-PE" dirty="0"/>
           </a:p>
@@ -6446,7 +6438,7 @@
           <a:bodyPr/>
           <a:lstStyle/>
           <a:p>
-            <a:fld id="{80C14895-23C8-45AE-85D5-3B35E5980A68}" type="slidenum">
+            <a:fld id="{92D0504E-A398-466F-BEA7-CB196C14635F}" type="slidenum">
               <a:rPr lang="es-PE" smtClean="0"/>
               <a:t>51</a:t>
             </a:fld>
@@ -6457,7 +6449,7 @@
     </p:spTree>
     <p:extLst>
       <p:ext uri="{BB962C8B-B14F-4D97-AF65-F5344CB8AC3E}">
-        <p14:creationId xmlns:p14="http://schemas.microsoft.com/office/powerpoint/2010/main" val="3432092158"/>
+        <p14:creationId xmlns:p14="http://schemas.microsoft.com/office/powerpoint/2010/main" val="3117317914"/>
       </p:ext>
     </p:extLst>
   </p:cSld>
@@ -6615,18 +6607,23 @@
           <a:bodyPr/>
           <a:lstStyle/>
           <a:p>
-            <a:r>
-              <a:rPr lang="en-US" sz="1200" b="0" i="0" kern="1200" dirty="0" smtClean="0">
-                <a:solidFill>
-                  <a:schemeClr val="tx1"/>
-                </a:solidFill>
-                <a:effectLst/>
-                <a:latin typeface="+mn-lt"/>
-                <a:ea typeface="+mn-ea"/>
-                <a:cs typeface="+mn-cs"/>
-              </a:rPr>
-              <a:t> </a:t>
-            </a:r>
+            <a:pPr marL="0" marR="0" indent="0" algn="l" defTabSz="914400" rtl="0" eaLnBrk="1" fontAlgn="auto" latinLnBrk="0" hangingPunct="1">
+              <a:lnSpc>
+                <a:spcPct val="100000"/>
+              </a:lnSpc>
+              <a:spcBef>
+                <a:spcPts val="0"/>
+              </a:spcBef>
+              <a:spcAft>
+                <a:spcPts val="0"/>
+              </a:spcAft>
+              <a:buClrTx/>
+              <a:buSzTx/>
+              <a:buFontTx/>
+              <a:buNone/>
+              <a:tabLst/>
+              <a:defRPr/>
+            </a:pPr>
             <a:endParaRPr lang="es-PE" dirty="0"/>
           </a:p>
         </p:txBody>
@@ -6646,7 +6643,7 @@
           <a:bodyPr/>
           <a:lstStyle/>
           <a:p>
-            <a:fld id="{92D0504E-A398-466F-BEA7-CB196C14635F}" type="slidenum">
+            <a:fld id="{80C14895-23C8-45AE-85D5-3B35E5980A68}" type="slidenum">
               <a:rPr lang="es-PE" smtClean="0"/>
               <a:t>52</a:t>
             </a:fld>
@@ -6657,7 +6654,7 @@
     </p:spTree>
     <p:extLst>
       <p:ext uri="{BB962C8B-B14F-4D97-AF65-F5344CB8AC3E}">
-        <p14:creationId xmlns:p14="http://schemas.microsoft.com/office/powerpoint/2010/main" val="3117317914"/>
+        <p14:creationId xmlns:p14="http://schemas.microsoft.com/office/powerpoint/2010/main" val="3432092158"/>
       </p:ext>
     </p:extLst>
   </p:cSld>
@@ -6930,6 +6927,35 @@
               <a:tabLst/>
               <a:defRPr/>
             </a:pPr>
+            <a:r>
+              <a:rPr lang="es-PE" sz="1200" dirty="0" smtClean="0">
+                <a:solidFill>
+                  <a:schemeClr val="tx1">
+                    <a:lumMod val="65000"/>
+                  </a:schemeClr>
+                </a:solidFill>
+              </a:rPr>
+              <a:t>http://es.slideshare.net/ehendrickson/introduction-to-acceptance-test-driven-development-3491703</a:t>
+            </a:r>
+          </a:p>
+          <a:p>
+            <a:pPr marL="0" marR="0" indent="0" algn="l" defTabSz="914400" rtl="0" eaLnBrk="1" fontAlgn="auto" latinLnBrk="0" hangingPunct="1">
+              <a:lnSpc>
+                <a:spcPct val="100000"/>
+              </a:lnSpc>
+              <a:spcBef>
+                <a:spcPts val="0"/>
+              </a:spcBef>
+              <a:spcAft>
+                <a:spcPts val="0"/>
+              </a:spcAft>
+              <a:buClrTx/>
+              <a:buSzTx/>
+              <a:buFontTx/>
+              <a:buNone/>
+              <a:tabLst/>
+              <a:defRPr/>
+            </a:pPr>
             <a:endParaRPr lang="es-PE" dirty="0"/>
           </a:p>
         </p:txBody>
@@ -7144,52 +7170,6 @@
           <a:bodyPr/>
           <a:lstStyle/>
           <a:p>
-            <a:pPr marL="0" marR="0" indent="0" algn="l" defTabSz="914400" rtl="0" eaLnBrk="1" fontAlgn="auto" latinLnBrk="0" hangingPunct="1">
-              <a:lnSpc>
-                <a:spcPct val="100000"/>
-              </a:lnSpc>
-              <a:spcBef>
-                <a:spcPts val="0"/>
-              </a:spcBef>
-              <a:spcAft>
-                <a:spcPts val="0"/>
-              </a:spcAft>
-              <a:buClrTx/>
-              <a:buSzTx/>
-              <a:buFontTx/>
-              <a:buNone/>
-              <a:tabLst/>
-              <a:defRPr/>
-            </a:pPr>
-            <a:r>
-              <a:rPr lang="es-PE" sz="1200" dirty="0" smtClean="0">
-                <a:solidFill>
-                  <a:schemeClr val="tx1">
-                    <a:lumMod val="65000"/>
-                  </a:schemeClr>
-                </a:solidFill>
-              </a:rPr>
-              <a:t>http://es.slideshare.net/ehendrickson/introduction-to-acceptance-test-driven-development-3491703</a:t>
-            </a:r>
-          </a:p>
-          <a:p>
-            <a:pPr marL="0" marR="0" indent="0" algn="l" defTabSz="914400" rtl="0" eaLnBrk="1" fontAlgn="auto" latinLnBrk="0" hangingPunct="1">
-              <a:lnSpc>
-                <a:spcPct val="100000"/>
-              </a:lnSpc>
-              <a:spcBef>
-                <a:spcPts val="0"/>
-              </a:spcBef>
-              <a:spcAft>
-                <a:spcPts val="0"/>
-              </a:spcAft>
-              <a:buClrTx/>
-              <a:buSzTx/>
-              <a:buFontTx/>
-              <a:buNone/>
-              <a:tabLst/>
-              <a:defRPr/>
-            </a:pPr>
             <a:endParaRPr lang="es-PE" dirty="0"/>
           </a:p>
         </p:txBody>
@@ -7212,90 +7192,6 @@
             <a:fld id="{80C14895-23C8-45AE-85D5-3B35E5980A68}" type="slidenum">
               <a:rPr lang="es-PE" smtClean="0"/>
               <a:t>57</a:t>
-            </a:fld>
-            <a:endParaRPr lang="es-PE"/>
-          </a:p>
-        </p:txBody>
-      </p:sp>
-    </p:spTree>
-    <p:extLst>
-      <p:ext uri="{BB962C8B-B14F-4D97-AF65-F5344CB8AC3E}">
-        <p14:creationId xmlns:p14="http://schemas.microsoft.com/office/powerpoint/2010/main" val="3432092158"/>
-      </p:ext>
-    </p:extLst>
-  </p:cSld>
-  <p:clrMapOvr>
-    <a:masterClrMapping/>
-  </p:clrMapOvr>
-</p:notes>
-</file>
-
-<file path=ppt/notesSlides/notesSlide56.xml><?xml version="1.0" encoding="utf-8"?>
-<p:notes xmlns:a="http://schemas.openxmlformats.org/drawingml/2006/main" xmlns:r="http://schemas.openxmlformats.org/officeDocument/2006/relationships" xmlns:p="http://schemas.openxmlformats.org/presentationml/2006/main">
-  <p:cSld>
-    <p:spTree>
-      <p:nvGrpSpPr>
-        <p:cNvPr id="1" name=""/>
-        <p:cNvGrpSpPr/>
-        <p:nvPr/>
-      </p:nvGrpSpPr>
-      <p:grpSpPr>
-        <a:xfrm>
-          <a:off x="0" y="0"/>
-          <a:ext cx="0" cy="0"/>
-          <a:chOff x="0" y="0"/>
-          <a:chExt cx="0" cy="0"/>
-        </a:xfrm>
-      </p:grpSpPr>
-      <p:sp>
-        <p:nvSpPr>
-          <p:cNvPr id="2" name="1 Marcador de imagen de diapositiva"/>
-          <p:cNvSpPr>
-            <a:spLocks noGrp="1" noRot="1" noChangeAspect="1"/>
-          </p:cNvSpPr>
-          <p:nvPr>
-            <p:ph type="sldImg"/>
-          </p:nvPr>
-        </p:nvSpPr>
-        <p:spPr/>
-      </p:sp>
-      <p:sp>
-        <p:nvSpPr>
-          <p:cNvPr id="3" name="2 Marcador de notas"/>
-          <p:cNvSpPr>
-            <a:spLocks noGrp="1"/>
-          </p:cNvSpPr>
-          <p:nvPr>
-            <p:ph type="body" idx="1"/>
-          </p:nvPr>
-        </p:nvSpPr>
-        <p:spPr/>
-        <p:txBody>
-          <a:bodyPr/>
-          <a:lstStyle/>
-          <a:p>
-            <a:endParaRPr lang="es-PE" dirty="0"/>
-          </a:p>
-        </p:txBody>
-      </p:sp>
-      <p:sp>
-        <p:nvSpPr>
-          <p:cNvPr id="4" name="3 Marcador de número de diapositiva"/>
-          <p:cNvSpPr>
-            <a:spLocks noGrp="1"/>
-          </p:cNvSpPr>
-          <p:nvPr>
-            <p:ph type="sldNum" sz="quarter" idx="10"/>
-          </p:nvPr>
-        </p:nvSpPr>
-        <p:spPr/>
-        <p:txBody>
-          <a:bodyPr/>
-          <a:lstStyle/>
-          <a:p>
-            <a:fld id="{80C14895-23C8-45AE-85D5-3B35E5980A68}" type="slidenum">
-              <a:rPr lang="es-PE" smtClean="0"/>
-              <a:t>58</a:t>
             </a:fld>
             <a:endParaRPr lang="es-PE"/>
           </a:p>
@@ -7996,7 +7892,7 @@
             <a:fld id="{807CB568-C05F-482F-9F26-AA302B8892DF}" type="datetimeFigureOut">
               <a:rPr lang="es-ES" smtClean="0"/>
               <a:pPr/>
-              <a:t>13/12/2013</a:t>
+              <a:t>14/03/2014</a:t>
             </a:fld>
             <a:endParaRPr lang="es-ES"/>
           </a:p>
@@ -8175,7 +8071,7 @@
             <a:fld id="{807CB568-C05F-482F-9F26-AA302B8892DF}" type="datetimeFigureOut">
               <a:rPr lang="es-ES" smtClean="0"/>
               <a:pPr/>
-              <a:t>13/12/2013</a:t>
+              <a:t>14/03/2014</a:t>
             </a:fld>
             <a:endParaRPr lang="es-ES"/>
           </a:p>
@@ -8364,7 +8260,7 @@
             <a:fld id="{807CB568-C05F-482F-9F26-AA302B8892DF}" type="datetimeFigureOut">
               <a:rPr lang="es-ES" smtClean="0"/>
               <a:pPr/>
-              <a:t>13/12/2013</a:t>
+              <a:t>14/03/2014</a:t>
             </a:fld>
             <a:endParaRPr lang="es-ES"/>
           </a:p>
@@ -8543,7 +8439,7 @@
             <a:fld id="{807CB568-C05F-482F-9F26-AA302B8892DF}" type="datetimeFigureOut">
               <a:rPr lang="es-ES" smtClean="0"/>
               <a:pPr/>
-              <a:t>13/12/2013</a:t>
+              <a:t>14/03/2014</a:t>
             </a:fld>
             <a:endParaRPr lang="es-ES"/>
           </a:p>
@@ -8798,7 +8694,7 @@
             <a:fld id="{807CB568-C05F-482F-9F26-AA302B8892DF}" type="datetimeFigureOut">
               <a:rPr lang="es-ES" smtClean="0"/>
               <a:pPr/>
-              <a:t>13/12/2013</a:t>
+              <a:t>14/03/2014</a:t>
             </a:fld>
             <a:endParaRPr lang="es-ES"/>
           </a:p>
@@ -9095,7 +8991,7 @@
             <a:fld id="{807CB568-C05F-482F-9F26-AA302B8892DF}" type="datetimeFigureOut">
               <a:rPr lang="es-ES" smtClean="0"/>
               <a:pPr/>
-              <a:t>13/12/2013</a:t>
+              <a:t>14/03/2014</a:t>
             </a:fld>
             <a:endParaRPr lang="es-ES"/>
           </a:p>
@@ -9526,7 +9422,7 @@
             <a:fld id="{807CB568-C05F-482F-9F26-AA302B8892DF}" type="datetimeFigureOut">
               <a:rPr lang="es-ES" smtClean="0"/>
               <a:pPr/>
-              <a:t>13/12/2013</a:t>
+              <a:t>14/03/2014</a:t>
             </a:fld>
             <a:endParaRPr lang="es-ES"/>
           </a:p>
@@ -9653,7 +9549,7 @@
             <a:fld id="{807CB568-C05F-482F-9F26-AA302B8892DF}" type="datetimeFigureOut">
               <a:rPr lang="es-ES" smtClean="0"/>
               <a:pPr/>
-              <a:t>13/12/2013</a:t>
+              <a:t>14/03/2014</a:t>
             </a:fld>
             <a:endParaRPr lang="es-ES"/>
           </a:p>
@@ -9757,7 +9653,7 @@
             <a:fld id="{807CB568-C05F-482F-9F26-AA302B8892DF}" type="datetimeFigureOut">
               <a:rPr lang="es-ES" smtClean="0"/>
               <a:pPr/>
-              <a:t>13/12/2013</a:t>
+              <a:t>14/03/2014</a:t>
             </a:fld>
             <a:endParaRPr lang="es-ES"/>
           </a:p>
@@ -10043,7 +9939,7 @@
             <a:fld id="{807CB568-C05F-482F-9F26-AA302B8892DF}" type="datetimeFigureOut">
               <a:rPr lang="es-ES" smtClean="0"/>
               <a:pPr/>
-              <a:t>13/12/2013</a:t>
+              <a:t>14/03/2014</a:t>
             </a:fld>
             <a:endParaRPr lang="es-ES"/>
           </a:p>
@@ -10312,7 +10208,7 @@
             <a:fld id="{807CB568-C05F-482F-9F26-AA302B8892DF}" type="datetimeFigureOut">
               <a:rPr lang="es-ES" smtClean="0"/>
               <a:pPr/>
-              <a:t>13/12/2013</a:t>
+              <a:t>14/03/2014</a:t>
             </a:fld>
             <a:endParaRPr lang="es-ES"/>
           </a:p>
@@ -10563,7 +10459,7 @@
             <a:fld id="{807CB568-C05F-482F-9F26-AA302B8892DF}" type="datetimeFigureOut">
               <a:rPr lang="es-ES" smtClean="0"/>
               <a:pPr/>
-              <a:t>13/12/2013</a:t>
+              <a:t>14/03/2014</a:t>
             </a:fld>
             <a:endParaRPr lang="es-ES"/>
           </a:p>
@@ -26092,11 +25988,11 @@
   <p:clrMapOvr>
     <a:masterClrMapping/>
   </p:clrMapOvr>
-  <mc:AlternateContent xmlns:mc="http://schemas.openxmlformats.org/markup-compatibility/2006">
-    <mc:Choice xmlns:p14="http://schemas.microsoft.com/office/powerpoint/2010/main" Requires="p14">
+  <mc:AlternateContent xmlns:mc="http://schemas.openxmlformats.org/markup-compatibility/2006" xmlns:p14="http://schemas.microsoft.com/office/powerpoint/2010/main">
+    <mc:Choice Requires="p14">
       <p:transition spd="slow" p14:dur="2000"/>
     </mc:Choice>
-    <mc:Fallback>
+    <mc:Fallback xmlns="">
       <p:transition spd="slow"/>
     </mc:Fallback>
   </mc:AlternateContent>
@@ -26340,11 +26236,11 @@
   <p:clrMapOvr>
     <a:masterClrMapping/>
   </p:clrMapOvr>
-  <mc:AlternateContent xmlns:mc="http://schemas.openxmlformats.org/markup-compatibility/2006">
-    <mc:Choice xmlns:p14="http://schemas.microsoft.com/office/powerpoint/2010/main" Requires="p14">
+  <mc:AlternateContent xmlns:mc="http://schemas.openxmlformats.org/markup-compatibility/2006" xmlns:p14="http://schemas.microsoft.com/office/powerpoint/2010/main">
+    <mc:Choice Requires="p14">
       <p:transition spd="slow" p14:dur="2000"/>
     </mc:Choice>
-    <mc:Fallback>
+    <mc:Fallback xmlns="">
       <p:transition spd="slow"/>
     </mc:Fallback>
   </mc:AlternateContent>
@@ -26467,23 +26363,7 @@
                   <a:srgbClr val="FF0000"/>
                 </a:solidFill>
               </a:rPr>
-              <a:t>In order </a:t>
-            </a:r>
-            <a:r>
-              <a:rPr lang="en-US" sz="3600" dirty="0" smtClean="0">
-                <a:solidFill>
-                  <a:srgbClr val="FF0000"/>
-                </a:solidFill>
-              </a:rPr>
-              <a:t>t</a:t>
-            </a:r>
-            <a:r>
-              <a:rPr lang="en-US" sz="3600" dirty="0" smtClean="0">
-                <a:solidFill>
-                  <a:srgbClr val="FF0000"/>
-                </a:solidFill>
-              </a:rPr>
-              <a:t>o </a:t>
+              <a:t>In order to </a:t>
             </a:r>
             <a:r>
               <a:rPr lang="en-US" sz="3600" dirty="0" smtClean="0"/>
@@ -26656,146 +26536,6 @@
               <a:rPr lang="es-PE" sz="4400" dirty="0" smtClean="0"/>
               <a:t>”</a:t>
             </a:r>
-            <a:endParaRPr lang="es-PE" sz="4400" dirty="0" smtClean="0"/>
-          </a:p>
-        </p:txBody>
-      </p:sp>
-    </p:spTree>
-    <p:extLst>
-      <p:ext uri="{BB962C8B-B14F-4D97-AF65-F5344CB8AC3E}">
-        <p14:creationId xmlns:p14="http://schemas.microsoft.com/office/powerpoint/2010/main" val="2546922599"/>
-      </p:ext>
-    </p:extLst>
-  </p:cSld>
-  <p:clrMapOvr>
-    <a:masterClrMapping/>
-  </p:clrMapOvr>
-  <p:timing>
-    <p:tnLst>
-      <p:par>
-        <p:cTn id="1" dur="indefinite" restart="never" nodeType="tmRoot"/>
-      </p:par>
-    </p:tnLst>
-  </p:timing>
-</p:sld>
-</file>
-
-<file path=ppt/slides/slide44.xml><?xml version="1.0" encoding="utf-8"?>
-<p:sld xmlns:a="http://schemas.openxmlformats.org/drawingml/2006/main" xmlns:r="http://schemas.openxmlformats.org/officeDocument/2006/relationships" xmlns:p="http://schemas.openxmlformats.org/presentationml/2006/main">
-  <p:cSld>
-    <p:spTree>
-      <p:nvGrpSpPr>
-        <p:cNvPr id="1" name=""/>
-        <p:cNvGrpSpPr/>
-        <p:nvPr/>
-      </p:nvGrpSpPr>
-      <p:grpSpPr>
-        <a:xfrm>
-          <a:off x="0" y="0"/>
-          <a:ext cx="0" cy="0"/>
-          <a:chOff x="0" y="0"/>
-          <a:chExt cx="0" cy="0"/>
-        </a:xfrm>
-      </p:grpSpPr>
-      <p:sp>
-        <p:nvSpPr>
-          <p:cNvPr id="4" name="1 Título"/>
-          <p:cNvSpPr>
-            <a:spLocks noGrp="1"/>
-          </p:cNvSpPr>
-          <p:nvPr>
-            <p:ph type="title"/>
-          </p:nvPr>
-        </p:nvSpPr>
-        <p:spPr>
-          <a:xfrm>
-            <a:off x="433500" y="1412776"/>
-            <a:ext cx="8229600" cy="720080"/>
-          </a:xfrm>
-          <a:noFill/>
-          <a:ln w="9525">
-            <a:noFill/>
-            <a:miter lim="800000"/>
-            <a:headEnd/>
-            <a:tailEnd/>
-          </a:ln>
-        </p:spPr>
-        <p:txBody>
-          <a:bodyPr vert="horz" wrap="square" lIns="91440" tIns="45720" rIns="91440" bIns="45720" numCol="1" anchor="ctr" anchorCtr="0" compatLnSpc="1">
-            <a:prstTxWarp prst="textNoShape">
-              <a:avLst/>
-            </a:prstTxWarp>
-          </a:bodyPr>
-          <a:lstStyle/>
-          <a:p>
-            <a:r>
-              <a:rPr lang="es-PE" dirty="0" smtClean="0">
-                <a:solidFill>
-                  <a:srgbClr val="FFC000"/>
-                </a:solidFill>
-              </a:rPr>
-              <a:t>Objetivo</a:t>
-            </a:r>
-            <a:endParaRPr lang="es-PE" dirty="0">
-              <a:solidFill>
-                <a:srgbClr val="FFC000"/>
-              </a:solidFill>
-            </a:endParaRPr>
-          </a:p>
-        </p:txBody>
-      </p:sp>
-      <p:sp>
-        <p:nvSpPr>
-          <p:cNvPr id="3" name="2 CuadroTexto"/>
-          <p:cNvSpPr txBox="1"/>
-          <p:nvPr/>
-        </p:nvSpPr>
-        <p:spPr>
-          <a:xfrm>
-            <a:off x="395536" y="2529478"/>
-            <a:ext cx="8352928" cy="2123658"/>
-          </a:xfrm>
-          <a:prstGeom prst="rect">
-            <a:avLst/>
-          </a:prstGeom>
-          <a:noFill/>
-        </p:spPr>
-        <p:txBody>
-          <a:bodyPr wrap="square" rtlCol="0">
-            <a:spAutoFit/>
-          </a:bodyPr>
-          <a:lstStyle/>
-          <a:p>
-            <a:pPr algn="ctr"/>
-            <a:r>
-              <a:rPr lang="es-PE" sz="4400" dirty="0" smtClean="0"/>
-              <a:t>Crear ejemplos (escenarios</a:t>
-            </a:r>
-            <a:r>
-              <a:rPr lang="es-PE" sz="4400" dirty="0"/>
-              <a:t>)</a:t>
-            </a:r>
-            <a:r>
-              <a:rPr lang="es-PE" sz="4400" dirty="0" smtClean="0"/>
-              <a:t> que ayuden a comprender y explicar la historia “</a:t>
-            </a:r>
-            <a:r>
-              <a:rPr lang="es-PE" sz="4400" dirty="0" err="1" smtClean="0"/>
-              <a:t>Store</a:t>
-            </a:r>
-            <a:r>
-              <a:rPr lang="es-PE" sz="4400" dirty="0" smtClean="0"/>
-              <a:t> </a:t>
-            </a:r>
-            <a:r>
-              <a:rPr lang="es-PE" sz="4400" dirty="0" err="1" smtClean="0"/>
-              <a:t>Calculation</a:t>
-            </a:r>
-            <a:r>
-              <a:rPr lang="es-PE" sz="4400" dirty="0" smtClean="0"/>
-              <a:t>”</a:t>
-            </a:r>
-            <a:endParaRPr lang="es-PE" sz="4400" dirty="0" smtClean="0"/>
           </a:p>
         </p:txBody>
       </p:sp>
@@ -26819,7 +26559,7 @@
 </p:sld>
 </file>
 
-<file path=ppt/slides/slide45.xml><?xml version="1.0" encoding="utf-8"?>
+<file path=ppt/slides/slide44.xml><?xml version="1.0" encoding="utf-8"?>
 <p:sld xmlns:a="http://schemas.openxmlformats.org/drawingml/2006/main" xmlns:r="http://schemas.openxmlformats.org/officeDocument/2006/relationships" xmlns:p="http://schemas.openxmlformats.org/presentationml/2006/main">
   <p:cSld>
     <p:spTree>
@@ -26927,7 +26667,7 @@
 </p:sld>
 </file>
 
-<file path=ppt/slides/slide46.xml><?xml version="1.0" encoding="utf-8"?>
+<file path=ppt/slides/slide45.xml><?xml version="1.0" encoding="utf-8"?>
 <p:sld xmlns:a="http://schemas.openxmlformats.org/drawingml/2006/main" xmlns:r="http://schemas.openxmlformats.org/officeDocument/2006/relationships" xmlns:p="http://schemas.openxmlformats.org/presentationml/2006/main">
   <p:cSld>
     <p:spTree>
@@ -27073,7 +26813,7 @@
 </p:sld>
 </file>
 
-<file path=ppt/slides/slide47.xml><?xml version="1.0" encoding="utf-8"?>
+<file path=ppt/slides/slide46.xml><?xml version="1.0" encoding="utf-8"?>
 <p:sld xmlns:a="http://schemas.openxmlformats.org/drawingml/2006/main" xmlns:r="http://schemas.openxmlformats.org/officeDocument/2006/relationships" xmlns:p="http://schemas.openxmlformats.org/presentationml/2006/main">
   <p:cSld>
     <p:spTree>
@@ -27386,7 +27126,7 @@
 </p:sld>
 </file>
 
-<file path=ppt/slides/slide48.xml><?xml version="1.0" encoding="utf-8"?>
+<file path=ppt/slides/slide47.xml><?xml version="1.0" encoding="utf-8"?>
 <p:sld xmlns:a="http://schemas.openxmlformats.org/drawingml/2006/main" xmlns:r="http://schemas.openxmlformats.org/officeDocument/2006/relationships" xmlns:p="http://schemas.openxmlformats.org/presentationml/2006/main">
   <p:cSld>
     <p:spTree>
@@ -28199,7 +27939,7 @@
 </p:sld>
 </file>
 
-<file path=ppt/slides/slide49.xml><?xml version="1.0" encoding="utf-8"?>
+<file path=ppt/slides/slide48.xml><?xml version="1.0" encoding="utf-8"?>
 <p:sld xmlns:a="http://schemas.openxmlformats.org/drawingml/2006/main" xmlns:r="http://schemas.openxmlformats.org/officeDocument/2006/relationships" xmlns:p="http://schemas.openxmlformats.org/presentationml/2006/main">
   <p:cSld>
     <p:spTree>
@@ -28787,300 +28527,7 @@
 </p:sld>
 </file>
 
-<file path=ppt/slides/slide5.xml><?xml version="1.0" encoding="utf-8"?>
-<p:sld xmlns:a="http://schemas.openxmlformats.org/drawingml/2006/main" xmlns:r="http://schemas.openxmlformats.org/officeDocument/2006/relationships" xmlns:p="http://schemas.openxmlformats.org/presentationml/2006/main">
-  <p:cSld>
-    <p:spTree>
-      <p:nvGrpSpPr>
-        <p:cNvPr id="1" name=""/>
-        <p:cNvGrpSpPr/>
-        <p:nvPr/>
-      </p:nvGrpSpPr>
-      <p:grpSpPr>
-        <a:xfrm>
-          <a:off x="0" y="0"/>
-          <a:ext cx="0" cy="0"/>
-          <a:chOff x="0" y="0"/>
-          <a:chExt cx="0" cy="0"/>
-        </a:xfrm>
-      </p:grpSpPr>
-      <p:sp>
-        <p:nvSpPr>
-          <p:cNvPr id="4" name="1 Título"/>
-          <p:cNvSpPr>
-            <a:spLocks noGrp="1"/>
-          </p:cNvSpPr>
-          <p:nvPr>
-            <p:ph type="title"/>
-          </p:nvPr>
-        </p:nvSpPr>
-        <p:spPr>
-          <a:xfrm>
-            <a:off x="467544" y="216350"/>
-            <a:ext cx="8229600" cy="720080"/>
-          </a:xfrm>
-        </p:spPr>
-        <p:txBody>
-          <a:bodyPr/>
-          <a:lstStyle/>
-          <a:p>
-            <a:r>
-              <a:rPr lang="es-PE" dirty="0" smtClean="0">
-                <a:solidFill>
-                  <a:srgbClr val="C00000"/>
-                </a:solidFill>
-                <a:latin typeface="Arial" pitchFamily="34" charset="0"/>
-                <a:cs typeface="Arial" pitchFamily="34" charset="0"/>
-              </a:rPr>
-              <a:t>Ejercicio: </a:t>
-            </a:r>
-            <a:r>
-              <a:rPr lang="es-PE" dirty="0" err="1" smtClean="0">
-                <a:solidFill>
-                  <a:srgbClr val="C00000"/>
-                </a:solidFill>
-                <a:latin typeface="Arial" pitchFamily="34" charset="0"/>
-                <a:cs typeface="Arial" pitchFamily="34" charset="0"/>
-              </a:rPr>
-              <a:t>Tennis</a:t>
-            </a:r>
-            <a:endParaRPr lang="es-PE" dirty="0">
-              <a:solidFill>
-                <a:srgbClr val="C00000"/>
-              </a:solidFill>
-              <a:latin typeface="Arial" pitchFamily="34" charset="0"/>
-              <a:cs typeface="Arial" pitchFamily="34" charset="0"/>
-            </a:endParaRPr>
-          </a:p>
-        </p:txBody>
-      </p:sp>
-      <p:sp>
-        <p:nvSpPr>
-          <p:cNvPr id="7" name="2 Marcador de contenido"/>
-          <p:cNvSpPr>
-            <a:spLocks noGrp="1"/>
-          </p:cNvSpPr>
-          <p:nvPr>
-            <p:ph idx="1"/>
-          </p:nvPr>
-        </p:nvSpPr>
-        <p:spPr>
-          <a:xfrm>
-            <a:off x="372169" y="2878256"/>
-            <a:ext cx="8232279" cy="3143032"/>
-          </a:xfrm>
-        </p:spPr>
-        <p:txBody>
-          <a:bodyPr/>
-          <a:lstStyle/>
-          <a:p>
-            <a:pPr>
-              <a:lnSpc>
-                <a:spcPts val="4500"/>
-              </a:lnSpc>
-              <a:buSzPct val="150000"/>
-              <a:buFontTx/>
-              <a:buChar char="-"/>
-            </a:pPr>
-            <a:r>
-              <a:rPr lang="es-PE" sz="2400" dirty="0" smtClean="0">
-                <a:cs typeface="Arial" pitchFamily="34" charset="0"/>
-              </a:rPr>
-              <a:t>Los jugadores deben poder anotar puntos. El programa debe mostrar el puntaje cada vez que un jugador anote: "15,40"</a:t>
-            </a:r>
-          </a:p>
-          <a:p>
-            <a:pPr>
-              <a:lnSpc>
-                <a:spcPts val="4500"/>
-              </a:lnSpc>
-              <a:buSzPct val="150000"/>
-              <a:buFontTx/>
-              <a:buChar char="-"/>
-            </a:pPr>
-            <a:r>
-              <a:rPr lang="es-PE" sz="2400" dirty="0" smtClean="0">
-                <a:cs typeface="Arial" pitchFamily="34" charset="0"/>
-              </a:rPr>
-              <a:t>El juego debe terminar si hay un ganador y debe mostrar quién ganó: "Juan </a:t>
-            </a:r>
-            <a:r>
-              <a:rPr lang="es-PE" sz="2400" dirty="0" err="1" smtClean="0">
-                <a:cs typeface="Arial" pitchFamily="34" charset="0"/>
-              </a:rPr>
-              <a:t>wins</a:t>
-            </a:r>
-            <a:r>
-              <a:rPr lang="es-PE" sz="2400" dirty="0" smtClean="0">
-                <a:cs typeface="Arial" pitchFamily="34" charset="0"/>
-              </a:rPr>
-              <a:t>".</a:t>
-            </a:r>
-          </a:p>
-          <a:p>
-            <a:pPr>
-              <a:lnSpc>
-                <a:spcPts val="4500"/>
-              </a:lnSpc>
-              <a:buSzPct val="150000"/>
-              <a:buFontTx/>
-              <a:buChar char="-"/>
-            </a:pPr>
-            <a:r>
-              <a:rPr lang="es-PE" sz="2400" dirty="0" smtClean="0">
-                <a:cs typeface="Arial" pitchFamily="34" charset="0"/>
-              </a:rPr>
-              <a:t>Se debe considerar el </a:t>
-            </a:r>
-            <a:r>
-              <a:rPr lang="es-PE" sz="2400" dirty="0" err="1" smtClean="0">
-                <a:cs typeface="Arial" pitchFamily="34" charset="0"/>
-              </a:rPr>
-              <a:t>deuce</a:t>
-            </a:r>
-            <a:r>
-              <a:rPr lang="es-PE" sz="2400" dirty="0" smtClean="0">
-                <a:cs typeface="Arial" pitchFamily="34" charset="0"/>
-              </a:rPr>
-              <a:t>: "</a:t>
-            </a:r>
-            <a:r>
-              <a:rPr lang="es-PE" sz="2400" dirty="0" err="1" smtClean="0">
-                <a:cs typeface="Arial" pitchFamily="34" charset="0"/>
-              </a:rPr>
-              <a:t>Deuce</a:t>
-            </a:r>
-            <a:r>
-              <a:rPr lang="es-PE" sz="2400" dirty="0" smtClean="0">
-                <a:cs typeface="Arial" pitchFamily="34" charset="0"/>
-              </a:rPr>
-              <a:t>", "</a:t>
-            </a:r>
-            <a:r>
-              <a:rPr lang="es-PE" sz="2400" dirty="0" err="1" smtClean="0">
-                <a:cs typeface="Arial" pitchFamily="34" charset="0"/>
-              </a:rPr>
-              <a:t>Advantage</a:t>
-            </a:r>
-            <a:r>
-              <a:rPr lang="es-PE" sz="2400" dirty="0" smtClean="0">
-                <a:cs typeface="Arial" pitchFamily="34" charset="0"/>
-              </a:rPr>
-              <a:t> Juan".</a:t>
-            </a:r>
-          </a:p>
-        </p:txBody>
-      </p:sp>
-      <p:sp>
-        <p:nvSpPr>
-          <p:cNvPr id="3" name="2 Rectángulo"/>
-          <p:cNvSpPr/>
-          <p:nvPr/>
-        </p:nvSpPr>
-        <p:spPr>
-          <a:xfrm>
-            <a:off x="395536" y="1596425"/>
-            <a:ext cx="8496944" cy="1183466"/>
-          </a:xfrm>
-          <a:prstGeom prst="rect">
-            <a:avLst/>
-          </a:prstGeom>
-        </p:spPr>
-        <p:txBody>
-          <a:bodyPr wrap="square">
-            <a:spAutoFit/>
-          </a:bodyPr>
-          <a:lstStyle/>
-          <a:p>
-            <a:pPr>
-              <a:lnSpc>
-                <a:spcPts val="4500"/>
-              </a:lnSpc>
-              <a:buSzPct val="150000"/>
-            </a:pPr>
-            <a:r>
-              <a:rPr lang="es-PE" sz="2400" dirty="0" smtClean="0"/>
-              <a:t>Escribir un programar que maneje los siguiente requerimientos de un juego de </a:t>
-            </a:r>
-            <a:r>
-              <a:rPr lang="es-PE" sz="2400" dirty="0" err="1" smtClean="0"/>
-              <a:t>tennis</a:t>
-            </a:r>
-            <a:r>
-              <a:rPr lang="es-PE" sz="2400" dirty="0" smtClean="0"/>
-              <a:t>:</a:t>
-            </a:r>
-            <a:endParaRPr lang="es-PE" sz="2400" dirty="0">
-              <a:cs typeface="Arial" pitchFamily="34" charset="0"/>
-            </a:endParaRPr>
-          </a:p>
-        </p:txBody>
-      </p:sp>
-      <p:sp>
-        <p:nvSpPr>
-          <p:cNvPr id="10" name="9 Rectángulo"/>
-          <p:cNvSpPr/>
-          <p:nvPr/>
-        </p:nvSpPr>
-        <p:spPr>
-          <a:xfrm>
-            <a:off x="395536" y="991420"/>
-            <a:ext cx="8496944" cy="669414"/>
-          </a:xfrm>
-          <a:prstGeom prst="rect">
-            <a:avLst/>
-          </a:prstGeom>
-        </p:spPr>
-        <p:txBody>
-          <a:bodyPr wrap="square">
-            <a:spAutoFit/>
-          </a:bodyPr>
-          <a:lstStyle/>
-          <a:p>
-            <a:pPr algn="ctr">
-              <a:lnSpc>
-                <a:spcPts val="4500"/>
-              </a:lnSpc>
-              <a:buSzPct val="150000"/>
-            </a:pPr>
-            <a:r>
-              <a:rPr lang="es-PE" sz="2800" b="1" dirty="0" smtClean="0">
-                <a:solidFill>
-                  <a:srgbClr val="FFC000"/>
-                </a:solidFill>
-              </a:rPr>
-              <a:t>Requerimientos</a:t>
-            </a:r>
-            <a:endParaRPr lang="es-PE" sz="2800" b="1" dirty="0">
-              <a:solidFill>
-                <a:srgbClr val="FFC000"/>
-              </a:solidFill>
-              <a:cs typeface="Arial" pitchFamily="34" charset="0"/>
-            </a:endParaRPr>
-          </a:p>
-        </p:txBody>
-      </p:sp>
-    </p:spTree>
-    <p:extLst>
-      <p:ext uri="{BB962C8B-B14F-4D97-AF65-F5344CB8AC3E}">
-        <p14:creationId xmlns:p14="http://schemas.microsoft.com/office/powerpoint/2010/main" val="1789055799"/>
-      </p:ext>
-    </p:extLst>
-  </p:cSld>
-  <p:clrMapOvr>
-    <a:masterClrMapping/>
-  </p:clrMapOvr>
-  <p:timing>
-    <p:tnLst>
-      <p:par>
-        <p:cTn id="1" dur="indefinite" restart="never" nodeType="tmRoot"/>
-      </p:par>
-    </p:tnLst>
-  </p:timing>
-</p:sld>
-</file>
-
-<file path=ppt/slides/slide50.xml><?xml version="1.0" encoding="utf-8"?>
+<file path=ppt/slides/slide49.xml><?xml version="1.0" encoding="utf-8"?>
 <p:sld xmlns:a="http://schemas.openxmlformats.org/drawingml/2006/main" xmlns:r="http://schemas.openxmlformats.org/officeDocument/2006/relationships" xmlns:p="http://schemas.openxmlformats.org/presentationml/2006/main">
   <p:cSld>
     <p:spTree>
@@ -29891,7 +29338,300 @@
 </p:sld>
 </file>
 
-<file path=ppt/slides/slide51.xml><?xml version="1.0" encoding="utf-8"?>
+<file path=ppt/slides/slide5.xml><?xml version="1.0" encoding="utf-8"?>
+<p:sld xmlns:a="http://schemas.openxmlformats.org/drawingml/2006/main" xmlns:r="http://schemas.openxmlformats.org/officeDocument/2006/relationships" xmlns:p="http://schemas.openxmlformats.org/presentationml/2006/main">
+  <p:cSld>
+    <p:spTree>
+      <p:nvGrpSpPr>
+        <p:cNvPr id="1" name=""/>
+        <p:cNvGrpSpPr/>
+        <p:nvPr/>
+      </p:nvGrpSpPr>
+      <p:grpSpPr>
+        <a:xfrm>
+          <a:off x="0" y="0"/>
+          <a:ext cx="0" cy="0"/>
+          <a:chOff x="0" y="0"/>
+          <a:chExt cx="0" cy="0"/>
+        </a:xfrm>
+      </p:grpSpPr>
+      <p:sp>
+        <p:nvSpPr>
+          <p:cNvPr id="4" name="1 Título"/>
+          <p:cNvSpPr>
+            <a:spLocks noGrp="1"/>
+          </p:cNvSpPr>
+          <p:nvPr>
+            <p:ph type="title"/>
+          </p:nvPr>
+        </p:nvSpPr>
+        <p:spPr>
+          <a:xfrm>
+            <a:off x="467544" y="216350"/>
+            <a:ext cx="8229600" cy="720080"/>
+          </a:xfrm>
+        </p:spPr>
+        <p:txBody>
+          <a:bodyPr/>
+          <a:lstStyle/>
+          <a:p>
+            <a:r>
+              <a:rPr lang="es-PE" dirty="0" smtClean="0">
+                <a:solidFill>
+                  <a:srgbClr val="C00000"/>
+                </a:solidFill>
+                <a:latin typeface="Arial" pitchFamily="34" charset="0"/>
+                <a:cs typeface="Arial" pitchFamily="34" charset="0"/>
+              </a:rPr>
+              <a:t>Ejercicio: </a:t>
+            </a:r>
+            <a:r>
+              <a:rPr lang="es-PE" dirty="0" err="1" smtClean="0">
+                <a:solidFill>
+                  <a:srgbClr val="C00000"/>
+                </a:solidFill>
+                <a:latin typeface="Arial" pitchFamily="34" charset="0"/>
+                <a:cs typeface="Arial" pitchFamily="34" charset="0"/>
+              </a:rPr>
+              <a:t>Tennis</a:t>
+            </a:r>
+            <a:endParaRPr lang="es-PE" dirty="0">
+              <a:solidFill>
+                <a:srgbClr val="C00000"/>
+              </a:solidFill>
+              <a:latin typeface="Arial" pitchFamily="34" charset="0"/>
+              <a:cs typeface="Arial" pitchFamily="34" charset="0"/>
+            </a:endParaRPr>
+          </a:p>
+        </p:txBody>
+      </p:sp>
+      <p:sp>
+        <p:nvSpPr>
+          <p:cNvPr id="7" name="2 Marcador de contenido"/>
+          <p:cNvSpPr>
+            <a:spLocks noGrp="1"/>
+          </p:cNvSpPr>
+          <p:nvPr>
+            <p:ph idx="1"/>
+          </p:nvPr>
+        </p:nvSpPr>
+        <p:spPr>
+          <a:xfrm>
+            <a:off x="372169" y="2878256"/>
+            <a:ext cx="8232279" cy="3143032"/>
+          </a:xfrm>
+        </p:spPr>
+        <p:txBody>
+          <a:bodyPr/>
+          <a:lstStyle/>
+          <a:p>
+            <a:pPr>
+              <a:lnSpc>
+                <a:spcPts val="4500"/>
+              </a:lnSpc>
+              <a:buSzPct val="150000"/>
+              <a:buFontTx/>
+              <a:buChar char="-"/>
+            </a:pPr>
+            <a:r>
+              <a:rPr lang="es-PE" sz="2400" dirty="0" smtClean="0">
+                <a:cs typeface="Arial" pitchFamily="34" charset="0"/>
+              </a:rPr>
+              <a:t>Los jugadores deben poder anotar puntos. El programa debe mostrar el puntaje cada vez que un jugador anote: "15,40"</a:t>
+            </a:r>
+          </a:p>
+          <a:p>
+            <a:pPr>
+              <a:lnSpc>
+                <a:spcPts val="4500"/>
+              </a:lnSpc>
+              <a:buSzPct val="150000"/>
+              <a:buFontTx/>
+              <a:buChar char="-"/>
+            </a:pPr>
+            <a:r>
+              <a:rPr lang="es-PE" sz="2400" dirty="0" smtClean="0">
+                <a:cs typeface="Arial" pitchFamily="34" charset="0"/>
+              </a:rPr>
+              <a:t>El juego debe terminar si hay un ganador y debe mostrar quién ganó: "Juan </a:t>
+            </a:r>
+            <a:r>
+              <a:rPr lang="es-PE" sz="2400" dirty="0" err="1" smtClean="0">
+                <a:cs typeface="Arial" pitchFamily="34" charset="0"/>
+              </a:rPr>
+              <a:t>wins</a:t>
+            </a:r>
+            <a:r>
+              <a:rPr lang="es-PE" sz="2400" dirty="0" smtClean="0">
+                <a:cs typeface="Arial" pitchFamily="34" charset="0"/>
+              </a:rPr>
+              <a:t>".</a:t>
+            </a:r>
+          </a:p>
+          <a:p>
+            <a:pPr>
+              <a:lnSpc>
+                <a:spcPts val="4500"/>
+              </a:lnSpc>
+              <a:buSzPct val="150000"/>
+              <a:buFontTx/>
+              <a:buChar char="-"/>
+            </a:pPr>
+            <a:r>
+              <a:rPr lang="es-PE" sz="2400" dirty="0" smtClean="0">
+                <a:cs typeface="Arial" pitchFamily="34" charset="0"/>
+              </a:rPr>
+              <a:t>Se debe considerar el </a:t>
+            </a:r>
+            <a:r>
+              <a:rPr lang="es-PE" sz="2400" dirty="0" err="1" smtClean="0">
+                <a:cs typeface="Arial" pitchFamily="34" charset="0"/>
+              </a:rPr>
+              <a:t>deuce</a:t>
+            </a:r>
+            <a:r>
+              <a:rPr lang="es-PE" sz="2400" dirty="0" smtClean="0">
+                <a:cs typeface="Arial" pitchFamily="34" charset="0"/>
+              </a:rPr>
+              <a:t>: "</a:t>
+            </a:r>
+            <a:r>
+              <a:rPr lang="es-PE" sz="2400" dirty="0" err="1" smtClean="0">
+                <a:cs typeface="Arial" pitchFamily="34" charset="0"/>
+              </a:rPr>
+              <a:t>Deuce</a:t>
+            </a:r>
+            <a:r>
+              <a:rPr lang="es-PE" sz="2400" dirty="0" smtClean="0">
+                <a:cs typeface="Arial" pitchFamily="34" charset="0"/>
+              </a:rPr>
+              <a:t>", "</a:t>
+            </a:r>
+            <a:r>
+              <a:rPr lang="es-PE" sz="2400" dirty="0" err="1" smtClean="0">
+                <a:cs typeface="Arial" pitchFamily="34" charset="0"/>
+              </a:rPr>
+              <a:t>Advantage</a:t>
+            </a:r>
+            <a:r>
+              <a:rPr lang="es-PE" sz="2400" dirty="0" smtClean="0">
+                <a:cs typeface="Arial" pitchFamily="34" charset="0"/>
+              </a:rPr>
+              <a:t> Juan".</a:t>
+            </a:r>
+          </a:p>
+        </p:txBody>
+      </p:sp>
+      <p:sp>
+        <p:nvSpPr>
+          <p:cNvPr id="3" name="2 Rectángulo"/>
+          <p:cNvSpPr/>
+          <p:nvPr/>
+        </p:nvSpPr>
+        <p:spPr>
+          <a:xfrm>
+            <a:off x="395536" y="1596425"/>
+            <a:ext cx="8496944" cy="1183466"/>
+          </a:xfrm>
+          <a:prstGeom prst="rect">
+            <a:avLst/>
+          </a:prstGeom>
+        </p:spPr>
+        <p:txBody>
+          <a:bodyPr wrap="square">
+            <a:spAutoFit/>
+          </a:bodyPr>
+          <a:lstStyle/>
+          <a:p>
+            <a:pPr>
+              <a:lnSpc>
+                <a:spcPts val="4500"/>
+              </a:lnSpc>
+              <a:buSzPct val="150000"/>
+            </a:pPr>
+            <a:r>
+              <a:rPr lang="es-PE" sz="2400" dirty="0" smtClean="0"/>
+              <a:t>Escribir un programar que maneje los siguiente requerimientos de un juego de </a:t>
+            </a:r>
+            <a:r>
+              <a:rPr lang="es-PE" sz="2400" dirty="0" err="1" smtClean="0"/>
+              <a:t>tennis</a:t>
+            </a:r>
+            <a:r>
+              <a:rPr lang="es-PE" sz="2400" dirty="0" smtClean="0"/>
+              <a:t>:</a:t>
+            </a:r>
+            <a:endParaRPr lang="es-PE" sz="2400" dirty="0">
+              <a:cs typeface="Arial" pitchFamily="34" charset="0"/>
+            </a:endParaRPr>
+          </a:p>
+        </p:txBody>
+      </p:sp>
+      <p:sp>
+        <p:nvSpPr>
+          <p:cNvPr id="10" name="9 Rectángulo"/>
+          <p:cNvSpPr/>
+          <p:nvPr/>
+        </p:nvSpPr>
+        <p:spPr>
+          <a:xfrm>
+            <a:off x="395536" y="991420"/>
+            <a:ext cx="8496944" cy="669414"/>
+          </a:xfrm>
+          <a:prstGeom prst="rect">
+            <a:avLst/>
+          </a:prstGeom>
+        </p:spPr>
+        <p:txBody>
+          <a:bodyPr wrap="square">
+            <a:spAutoFit/>
+          </a:bodyPr>
+          <a:lstStyle/>
+          <a:p>
+            <a:pPr algn="ctr">
+              <a:lnSpc>
+                <a:spcPts val="4500"/>
+              </a:lnSpc>
+              <a:buSzPct val="150000"/>
+            </a:pPr>
+            <a:r>
+              <a:rPr lang="es-PE" sz="2800" b="1" dirty="0" smtClean="0">
+                <a:solidFill>
+                  <a:srgbClr val="FFC000"/>
+                </a:solidFill>
+              </a:rPr>
+              <a:t>Requerimientos</a:t>
+            </a:r>
+            <a:endParaRPr lang="es-PE" sz="2800" b="1" dirty="0">
+              <a:solidFill>
+                <a:srgbClr val="FFC000"/>
+              </a:solidFill>
+              <a:cs typeface="Arial" pitchFamily="34" charset="0"/>
+            </a:endParaRPr>
+          </a:p>
+        </p:txBody>
+      </p:sp>
+    </p:spTree>
+    <p:extLst>
+      <p:ext uri="{BB962C8B-B14F-4D97-AF65-F5344CB8AC3E}">
+        <p14:creationId xmlns:p14="http://schemas.microsoft.com/office/powerpoint/2010/main" val="1789055799"/>
+      </p:ext>
+    </p:extLst>
+  </p:cSld>
+  <p:clrMapOvr>
+    <a:masterClrMapping/>
+  </p:clrMapOvr>
+  <p:timing>
+    <p:tnLst>
+      <p:par>
+        <p:cTn id="1" dur="indefinite" restart="never" nodeType="tmRoot"/>
+      </p:par>
+    </p:tnLst>
+  </p:timing>
+</p:sld>
+</file>
+
+<file path=ppt/slides/slide50.xml><?xml version="1.0" encoding="utf-8"?>
 <p:sld xmlns:a="http://schemas.openxmlformats.org/drawingml/2006/main" xmlns:r="http://schemas.openxmlformats.org/officeDocument/2006/relationships" xmlns:p="http://schemas.openxmlformats.org/presentationml/2006/main">
   <p:cSld>
     <p:spTree>
@@ -30446,7 +30186,7 @@
 </p:sld>
 </file>
 
-<file path=ppt/slides/slide52.xml><?xml version="1.0" encoding="utf-8"?>
+<file path=ppt/slides/slide51.xml><?xml version="1.0" encoding="utf-8"?>
 <p:sld xmlns:a="http://schemas.openxmlformats.org/drawingml/2006/main" xmlns:r="http://schemas.openxmlformats.org/officeDocument/2006/relationships" xmlns:p="http://schemas.openxmlformats.org/presentationml/2006/main">
   <p:cSld>
     <p:spTree>
@@ -30791,7 +30531,7 @@
 </p:sld>
 </file>
 
-<file path=ppt/slides/slide53.xml><?xml version="1.0" encoding="utf-8"?>
+<file path=ppt/slides/slide52.xml><?xml version="1.0" encoding="utf-8"?>
 <p:sld xmlns:a="http://schemas.openxmlformats.org/drawingml/2006/main" xmlns:r="http://schemas.openxmlformats.org/officeDocument/2006/relationships" xmlns:p="http://schemas.openxmlformats.org/presentationml/2006/main">
   <p:cSld>
     <p:spTree>
@@ -30982,7 +30722,7 @@
 </p:sld>
 </file>
 
-<file path=ppt/slides/slide54.xml><?xml version="1.0" encoding="utf-8"?>
+<file path=ppt/slides/slide53.xml><?xml version="1.0" encoding="utf-8"?>
 <p:sld xmlns:a="http://schemas.openxmlformats.org/drawingml/2006/main" xmlns:r="http://schemas.openxmlformats.org/officeDocument/2006/relationships" xmlns:p="http://schemas.openxmlformats.org/presentationml/2006/main">
   <p:cSld>
     <p:spTree>
@@ -31173,7 +30913,7 @@
 </p:sld>
 </file>
 
-<file path=ppt/slides/slide55.xml><?xml version="1.0" encoding="utf-8"?>
+<file path=ppt/slides/slide54.xml><?xml version="1.0" encoding="utf-8"?>
 <p:sld xmlns:a="http://schemas.openxmlformats.org/drawingml/2006/main" xmlns:r="http://schemas.openxmlformats.org/officeDocument/2006/relationships" xmlns:p="http://schemas.openxmlformats.org/presentationml/2006/main">
   <p:cSld>
     <p:spTree>
@@ -31283,7 +31023,7 @@
 </p:sld>
 </file>
 
-<file path=ppt/slides/slide56.xml><?xml version="1.0" encoding="utf-8"?>
+<file path=ppt/slides/slide55.xml><?xml version="1.0" encoding="utf-8"?>
 <p:sld xmlns:a="http://schemas.openxmlformats.org/drawingml/2006/main" xmlns:r="http://schemas.openxmlformats.org/officeDocument/2006/relationships" xmlns:p="http://schemas.openxmlformats.org/presentationml/2006/main">
   <p:cSld>
     <p:spTree>
@@ -31458,7 +31198,7 @@
 </p:sld>
 </file>
 
-<file path=ppt/slides/slide57.xml><?xml version="1.0" encoding="utf-8"?>
+<file path=ppt/slides/slide56.xml><?xml version="1.0" encoding="utf-8"?>
 <p:sld xmlns:a="http://schemas.openxmlformats.org/drawingml/2006/main" xmlns:r="http://schemas.openxmlformats.org/officeDocument/2006/relationships" xmlns:p="http://schemas.openxmlformats.org/presentationml/2006/main">
   <p:cSld>
     <p:spTree>
@@ -31832,7 +31572,7 @@
 </p:sld>
 </file>
 
-<file path=ppt/slides/slide58.xml><?xml version="1.0" encoding="utf-8"?>
+<file path=ppt/slides/slide57.xml><?xml version="1.0" encoding="utf-8"?>
 <p:sld xmlns:a="http://schemas.openxmlformats.org/drawingml/2006/main" xmlns:r="http://schemas.openxmlformats.org/officeDocument/2006/relationships" xmlns:p="http://schemas.openxmlformats.org/presentationml/2006/main">
   <p:cSld>
     <p:spTree>

</xml_diff>